<commit_message>
docs: update style and names
</commit_message>
<xml_diff>
--- a/documentos/apresentacao.pptx
+++ b/documentos/apresentacao.pptx
@@ -87,6 +87,9 @@
     <p:sldId id="332" r:id="rId82"/>
     <p:sldId id="333" r:id="rId83"/>
     <p:sldId id="334" r:id="rId84"/>
+    <p:sldId id="335" r:id="rId85"/>
+    <p:sldId id="336" r:id="rId86"/>
+    <p:sldId id="337" r:id="rId87"/>
   </p:sldIdLst>
   <p:sldSz cy="5143500" cx="9144000"/>
   <p:notesSz cx="6858000" cy="9144000"/>
@@ -8442,6 +8445,303 @@
       <p:sp>
         <p:nvSpPr>
           <p:cNvPr id="104" name="Google Shape;104;g366ac892da9_1_110:notes"/>
+          <p:cNvSpPr txBox="1"/>
+          <p:nvPr>
+            <p:ph idx="1" type="body"/>
+          </p:nvPr>
+        </p:nvSpPr>
+        <p:spPr>
+          <a:xfrm>
+            <a:off x="685800" y="4343400"/>
+            <a:ext cx="5486400" cy="4114800"/>
+          </a:xfrm>
+          <a:prstGeom prst="rect">
+            <a:avLst/>
+          </a:prstGeom>
+        </p:spPr>
+        <p:txBody>
+          <a:bodyPr anchorCtr="0" anchor="t" bIns="91425" lIns="91425" spcFirstLastPara="1" rIns="91425" wrap="square" tIns="91425">
+            <a:noAutofit/>
+          </a:bodyPr>
+          <a:lstStyle/>
+          <a:p>
+            <a:pPr indent="0" lvl="0" marL="0" rtl="0" algn="l">
+              <a:spcBef>
+                <a:spcPts val="0"/>
+              </a:spcBef>
+              <a:spcAft>
+                <a:spcPts val="0"/>
+              </a:spcAft>
+              <a:buNone/>
+            </a:pPr>
+            <a:r>
+              <a:t/>
+            </a:r>
+            <a:endParaRPr/>
+          </a:p>
+        </p:txBody>
+      </p:sp>
+    </p:spTree>
+  </p:cSld>
+  <p:clrMapOvr>
+    <a:masterClrMapping/>
+  </p:clrMapOvr>
+</p:notes>
+</file>
+
+<file path=ppt/notesSlides/notesSlide80.xml><?xml version="1.0" encoding="utf-8"?>
+<p:notes xmlns:a="http://schemas.openxmlformats.org/drawingml/2006/main" xmlns:r="http://schemas.openxmlformats.org/officeDocument/2006/relationships" xmlns:mc="http://schemas.openxmlformats.org/markup-compatibility/2006" xmlns:mv="urn:schemas-microsoft-com:mac:vml" xmlns:p="http://schemas.openxmlformats.org/presentationml/2006/main" xmlns:c="http://schemas.openxmlformats.org/drawingml/2006/chart" xmlns:dgm="http://schemas.openxmlformats.org/drawingml/2006/diagram" xmlns:o="urn:schemas-microsoft-com:office:office" xmlns:v="urn:schemas-microsoft-com:vml" xmlns:pvml="urn:schemas-microsoft-com:office:powerpoint" xmlns:com="http://schemas.openxmlformats.org/drawingml/2006/compatibility" xmlns:p14="http://schemas.microsoft.com/office/powerpoint/2010/main" xmlns:p15="http://schemas.microsoft.com/office/powerpoint/2012/main" xmlns:ahyp="http://schemas.microsoft.com/office/drawing/2018/hyperlinkcolor" showMasterPhAnim="0" showMasterSp="0">
+  <p:cSld>
+    <p:spTree>
+      <p:nvGrpSpPr>
+        <p:cNvPr id="737" name="Shape 737"/>
+        <p:cNvGrpSpPr/>
+        <p:nvPr/>
+      </p:nvGrpSpPr>
+      <p:grpSpPr>
+        <a:xfrm>
+          <a:off x="0" y="0"/>
+          <a:ext cx="0" cy="0"/>
+          <a:chOff x="0" y="0"/>
+          <a:chExt cx="0" cy="0"/>
+        </a:xfrm>
+      </p:grpSpPr>
+      <p:sp>
+        <p:nvSpPr>
+          <p:cNvPr id="738" name="Google Shape;738;g36221e14748_1_13:notes"/>
+          <p:cNvSpPr/>
+          <p:nvPr>
+            <p:ph idx="2" type="sldImg"/>
+          </p:nvPr>
+        </p:nvSpPr>
+        <p:spPr>
+          <a:xfrm>
+            <a:off x="381300" y="685800"/>
+            <a:ext cx="6096000" cy="3429000"/>
+          </a:xfrm>
+          <a:custGeom>
+            <a:rect b="b" l="l" r="r" t="t"/>
+            <a:pathLst>
+              <a:path extrusionOk="0" h="120000" w="120000">
+                <a:moveTo>
+                  <a:pt x="0" y="0"/>
+                </a:moveTo>
+                <a:lnTo>
+                  <a:pt x="120000" y="0"/>
+                </a:lnTo>
+                <a:lnTo>
+                  <a:pt x="120000" y="120000"/>
+                </a:lnTo>
+                <a:lnTo>
+                  <a:pt x="0" y="120000"/>
+                </a:lnTo>
+                <a:close/>
+              </a:path>
+            </a:pathLst>
+          </a:custGeom>
+        </p:spPr>
+      </p:sp>
+      <p:sp>
+        <p:nvSpPr>
+          <p:cNvPr id="739" name="Google Shape;739;g36221e14748_1_13:notes"/>
+          <p:cNvSpPr txBox="1"/>
+          <p:nvPr>
+            <p:ph idx="1" type="body"/>
+          </p:nvPr>
+        </p:nvSpPr>
+        <p:spPr>
+          <a:xfrm>
+            <a:off x="685800" y="4343400"/>
+            <a:ext cx="5486400" cy="4114800"/>
+          </a:xfrm>
+          <a:prstGeom prst="rect">
+            <a:avLst/>
+          </a:prstGeom>
+        </p:spPr>
+        <p:txBody>
+          <a:bodyPr anchorCtr="0" anchor="t" bIns="91425" lIns="91425" spcFirstLastPara="1" rIns="91425" wrap="square" tIns="91425">
+            <a:noAutofit/>
+          </a:bodyPr>
+          <a:lstStyle/>
+          <a:p>
+            <a:pPr indent="0" lvl="0" marL="0" rtl="0" algn="l">
+              <a:spcBef>
+                <a:spcPts val="0"/>
+              </a:spcBef>
+              <a:spcAft>
+                <a:spcPts val="0"/>
+              </a:spcAft>
+              <a:buNone/>
+            </a:pPr>
+            <a:r>
+              <a:t/>
+            </a:r>
+            <a:endParaRPr/>
+          </a:p>
+        </p:txBody>
+      </p:sp>
+    </p:spTree>
+  </p:cSld>
+  <p:clrMapOvr>
+    <a:masterClrMapping/>
+  </p:clrMapOvr>
+</p:notes>
+</file>
+
+<file path=ppt/notesSlides/notesSlide81.xml><?xml version="1.0" encoding="utf-8"?>
+<p:notes xmlns:a="http://schemas.openxmlformats.org/drawingml/2006/main" xmlns:r="http://schemas.openxmlformats.org/officeDocument/2006/relationships" xmlns:mc="http://schemas.openxmlformats.org/markup-compatibility/2006" xmlns:mv="urn:schemas-microsoft-com:mac:vml" xmlns:p="http://schemas.openxmlformats.org/presentationml/2006/main" xmlns:c="http://schemas.openxmlformats.org/drawingml/2006/chart" xmlns:dgm="http://schemas.openxmlformats.org/drawingml/2006/diagram" xmlns:o="urn:schemas-microsoft-com:office:office" xmlns:v="urn:schemas-microsoft-com:vml" xmlns:pvml="urn:schemas-microsoft-com:office:powerpoint" xmlns:com="http://schemas.openxmlformats.org/drawingml/2006/compatibility" xmlns:p14="http://schemas.microsoft.com/office/powerpoint/2010/main" xmlns:p15="http://schemas.microsoft.com/office/powerpoint/2012/main" xmlns:ahyp="http://schemas.microsoft.com/office/drawing/2018/hyperlinkcolor" showMasterPhAnim="0" showMasterSp="0">
+  <p:cSld>
+    <p:spTree>
+      <p:nvGrpSpPr>
+        <p:cNvPr id="744" name="Shape 744"/>
+        <p:cNvGrpSpPr/>
+        <p:nvPr/>
+      </p:nvGrpSpPr>
+      <p:grpSpPr>
+        <a:xfrm>
+          <a:off x="0" y="0"/>
+          <a:ext cx="0" cy="0"/>
+          <a:chOff x="0" y="0"/>
+          <a:chExt cx="0" cy="0"/>
+        </a:xfrm>
+      </p:grpSpPr>
+      <p:sp>
+        <p:nvSpPr>
+          <p:cNvPr id="745" name="Google Shape;745;g36221e14748_1_22:notes"/>
+          <p:cNvSpPr/>
+          <p:nvPr>
+            <p:ph idx="2" type="sldImg"/>
+          </p:nvPr>
+        </p:nvSpPr>
+        <p:spPr>
+          <a:xfrm>
+            <a:off x="381300" y="685800"/>
+            <a:ext cx="6096000" cy="3429000"/>
+          </a:xfrm>
+          <a:custGeom>
+            <a:rect b="b" l="l" r="r" t="t"/>
+            <a:pathLst>
+              <a:path extrusionOk="0" h="120000" w="120000">
+                <a:moveTo>
+                  <a:pt x="0" y="0"/>
+                </a:moveTo>
+                <a:lnTo>
+                  <a:pt x="120000" y="0"/>
+                </a:lnTo>
+                <a:lnTo>
+                  <a:pt x="120000" y="120000"/>
+                </a:lnTo>
+                <a:lnTo>
+                  <a:pt x="0" y="120000"/>
+                </a:lnTo>
+                <a:close/>
+              </a:path>
+            </a:pathLst>
+          </a:custGeom>
+        </p:spPr>
+      </p:sp>
+      <p:sp>
+        <p:nvSpPr>
+          <p:cNvPr id="746" name="Google Shape;746;g36221e14748_1_22:notes"/>
+          <p:cNvSpPr txBox="1"/>
+          <p:nvPr>
+            <p:ph idx="1" type="body"/>
+          </p:nvPr>
+        </p:nvSpPr>
+        <p:spPr>
+          <a:xfrm>
+            <a:off x="685800" y="4343400"/>
+            <a:ext cx="5486400" cy="4114800"/>
+          </a:xfrm>
+          <a:prstGeom prst="rect">
+            <a:avLst/>
+          </a:prstGeom>
+        </p:spPr>
+        <p:txBody>
+          <a:bodyPr anchorCtr="0" anchor="t" bIns="91425" lIns="91425" spcFirstLastPara="1" rIns="91425" wrap="square" tIns="91425">
+            <a:noAutofit/>
+          </a:bodyPr>
+          <a:lstStyle/>
+          <a:p>
+            <a:pPr indent="0" lvl="0" marL="0" rtl="0" algn="l">
+              <a:spcBef>
+                <a:spcPts val="0"/>
+              </a:spcBef>
+              <a:spcAft>
+                <a:spcPts val="0"/>
+              </a:spcAft>
+              <a:buNone/>
+            </a:pPr>
+            <a:r>
+              <a:t/>
+            </a:r>
+            <a:endParaRPr/>
+          </a:p>
+        </p:txBody>
+      </p:sp>
+    </p:spTree>
+  </p:cSld>
+  <p:clrMapOvr>
+    <a:masterClrMapping/>
+  </p:clrMapOvr>
+</p:notes>
+</file>
+
+<file path=ppt/notesSlides/notesSlide82.xml><?xml version="1.0" encoding="utf-8"?>
+<p:notes xmlns:a="http://schemas.openxmlformats.org/drawingml/2006/main" xmlns:r="http://schemas.openxmlformats.org/officeDocument/2006/relationships" xmlns:mc="http://schemas.openxmlformats.org/markup-compatibility/2006" xmlns:mv="urn:schemas-microsoft-com:mac:vml" xmlns:p="http://schemas.openxmlformats.org/presentationml/2006/main" xmlns:c="http://schemas.openxmlformats.org/drawingml/2006/chart" xmlns:dgm="http://schemas.openxmlformats.org/drawingml/2006/diagram" xmlns:o="urn:schemas-microsoft-com:office:office" xmlns:v="urn:schemas-microsoft-com:vml" xmlns:pvml="urn:schemas-microsoft-com:office:powerpoint" xmlns:com="http://schemas.openxmlformats.org/drawingml/2006/compatibility" xmlns:p14="http://schemas.microsoft.com/office/powerpoint/2010/main" xmlns:p15="http://schemas.microsoft.com/office/powerpoint/2012/main" xmlns:ahyp="http://schemas.microsoft.com/office/drawing/2018/hyperlinkcolor" showMasterPhAnim="0" showMasterSp="0">
+  <p:cSld>
+    <p:spTree>
+      <p:nvGrpSpPr>
+        <p:cNvPr id="751" name="Shape 751"/>
+        <p:cNvGrpSpPr/>
+        <p:nvPr/>
+      </p:nvGrpSpPr>
+      <p:grpSpPr>
+        <a:xfrm>
+          <a:off x="0" y="0"/>
+          <a:ext cx="0" cy="0"/>
+          <a:chOff x="0" y="0"/>
+          <a:chExt cx="0" cy="0"/>
+        </a:xfrm>
+      </p:grpSpPr>
+      <p:sp>
+        <p:nvSpPr>
+          <p:cNvPr id="752" name="Google Shape;752;g36221e14748_1_30:notes"/>
+          <p:cNvSpPr/>
+          <p:nvPr>
+            <p:ph idx="2" type="sldImg"/>
+          </p:nvPr>
+        </p:nvSpPr>
+        <p:spPr>
+          <a:xfrm>
+            <a:off x="381300" y="685800"/>
+            <a:ext cx="6096000" cy="3429000"/>
+          </a:xfrm>
+          <a:custGeom>
+            <a:rect b="b" l="l" r="r" t="t"/>
+            <a:pathLst>
+              <a:path extrusionOk="0" h="120000" w="120000">
+                <a:moveTo>
+                  <a:pt x="0" y="0"/>
+                </a:moveTo>
+                <a:lnTo>
+                  <a:pt x="120000" y="0"/>
+                </a:lnTo>
+                <a:lnTo>
+                  <a:pt x="120000" y="120000"/>
+                </a:lnTo>
+                <a:lnTo>
+                  <a:pt x="0" y="120000"/>
+                </a:lnTo>
+                <a:close/>
+              </a:path>
+            </a:pathLst>
+          </a:custGeom>
+        </p:spPr>
+      </p:sp>
+      <p:sp>
+        <p:nvSpPr>
+          <p:cNvPr id="753" name="Google Shape;753;g36221e14748_1_30:notes"/>
           <p:cNvSpPr txBox="1"/>
           <p:nvPr>
             <p:ph idx="1" type="body"/>
@@ -34351,6 +34651,861 @@
 </p:sld>
 </file>
 
+<file path=ppt/slides/slide80.xml><?xml version="1.0" encoding="utf-8"?>
+<p:sld xmlns:a="http://schemas.openxmlformats.org/drawingml/2006/main" xmlns:r="http://schemas.openxmlformats.org/officeDocument/2006/relationships" xmlns:mc="http://schemas.openxmlformats.org/markup-compatibility/2006" xmlns:mv="urn:schemas-microsoft-com:mac:vml" xmlns:p="http://schemas.openxmlformats.org/presentationml/2006/main" xmlns:c="http://schemas.openxmlformats.org/drawingml/2006/chart" xmlns:dgm="http://schemas.openxmlformats.org/drawingml/2006/diagram" xmlns:o="urn:schemas-microsoft-com:office:office" xmlns:v="urn:schemas-microsoft-com:vml" xmlns:pvml="urn:schemas-microsoft-com:office:powerpoint" xmlns:com="http://schemas.openxmlformats.org/drawingml/2006/compatibility" xmlns:p14="http://schemas.microsoft.com/office/powerpoint/2010/main" xmlns:p15="http://schemas.microsoft.com/office/powerpoint/2012/main" xmlns:ahyp="http://schemas.microsoft.com/office/drawing/2018/hyperlinkcolor">
+  <p:cSld>
+    <p:spTree>
+      <p:nvGrpSpPr>
+        <p:cNvPr id="740" name="Shape 740"/>
+        <p:cNvGrpSpPr/>
+        <p:nvPr/>
+      </p:nvGrpSpPr>
+      <p:grpSpPr>
+        <a:xfrm>
+          <a:off x="0" y="0"/>
+          <a:ext cx="0" cy="0"/>
+          <a:chOff x="0" y="0"/>
+          <a:chExt cx="0" cy="0"/>
+        </a:xfrm>
+      </p:grpSpPr>
+      <p:sp>
+        <p:nvSpPr>
+          <p:cNvPr id="741" name="Google Shape;741;p92"/>
+          <p:cNvSpPr txBox="1"/>
+          <p:nvPr>
+            <p:ph type="title"/>
+          </p:nvPr>
+        </p:nvSpPr>
+        <p:spPr>
+          <a:xfrm>
+            <a:off x="311700" y="445025"/>
+            <a:ext cx="8520600" cy="572700"/>
+          </a:xfrm>
+          <a:prstGeom prst="rect">
+            <a:avLst/>
+          </a:prstGeom>
+        </p:spPr>
+        <p:txBody>
+          <a:bodyPr anchorCtr="0" anchor="t" bIns="91425" lIns="91425" spcFirstLastPara="1" rIns="91425" wrap="square" tIns="91425">
+            <a:normAutofit fontScale="90000"/>
+          </a:bodyPr>
+          <a:lstStyle/>
+          <a:p>
+            <a:pPr indent="0" lvl="0" marL="0" rtl="0" algn="l">
+              <a:spcBef>
+                <a:spcPts val="0"/>
+              </a:spcBef>
+              <a:spcAft>
+                <a:spcPts val="0"/>
+              </a:spcAft>
+              <a:buNone/>
+            </a:pPr>
+            <a:r>
+              <a:rPr lang="en"/>
+              <a:t>Reconhecimentos e Direitos Autorais</a:t>
+            </a:r>
+            <a:endParaRPr/>
+          </a:p>
+        </p:txBody>
+      </p:sp>
+      <p:sp>
+        <p:nvSpPr>
+          <p:cNvPr id="742" name="Google Shape;742;p92"/>
+          <p:cNvSpPr txBox="1"/>
+          <p:nvPr>
+            <p:ph idx="1" type="body"/>
+          </p:nvPr>
+        </p:nvSpPr>
+        <p:spPr>
+          <a:xfrm>
+            <a:off x="311700" y="1152475"/>
+            <a:ext cx="8520600" cy="3416400"/>
+          </a:xfrm>
+          <a:prstGeom prst="rect">
+            <a:avLst/>
+          </a:prstGeom>
+        </p:spPr>
+        <p:txBody>
+          <a:bodyPr anchorCtr="0" anchor="t" bIns="91425" lIns="91425" spcFirstLastPara="1" rIns="91425" wrap="square" tIns="91425">
+            <a:normAutofit lnSpcReduction="10000"/>
+          </a:bodyPr>
+          <a:lstStyle/>
+          <a:p>
+            <a:pPr indent="0" lvl="0" marL="0" rtl="0" algn="l">
+              <a:spcBef>
+                <a:spcPts val="0"/>
+              </a:spcBef>
+              <a:spcAft>
+                <a:spcPts val="0"/>
+              </a:spcAft>
+              <a:buClr>
+                <a:schemeClr val="dk1"/>
+              </a:buClr>
+              <a:buSzPts val="1100"/>
+              <a:buFont typeface="Arial"/>
+              <a:buNone/>
+            </a:pPr>
+            <a:r>
+              <a:rPr lang="en"/>
+              <a:t>@autor: [Filipe das Chagas Pinheiro e Guilherme Roberto Matos Silva]</a:t>
+            </a:r>
+            <a:endParaRPr/>
+          </a:p>
+          <a:p>
+            <a:pPr indent="0" lvl="0" marL="0" rtl="0" algn="l">
+              <a:spcBef>
+                <a:spcPts val="1200"/>
+              </a:spcBef>
+              <a:spcAft>
+                <a:spcPts val="0"/>
+              </a:spcAft>
+              <a:buClr>
+                <a:schemeClr val="dk1"/>
+              </a:buClr>
+              <a:buSzPts val="1100"/>
+              <a:buFont typeface="Arial"/>
+              <a:buNone/>
+            </a:pPr>
+            <a:r>
+              <a:rPr lang="en"/>
+              <a:t>@contato: [filipe.pinheiro@discente.ufma.br - matos.guilherme@discente.ufma.br]</a:t>
+            </a:r>
+            <a:endParaRPr/>
+          </a:p>
+          <a:p>
+            <a:pPr indent="0" lvl="0" marL="0" rtl="0" algn="l">
+              <a:spcBef>
+                <a:spcPts val="1200"/>
+              </a:spcBef>
+              <a:spcAft>
+                <a:spcPts val="0"/>
+              </a:spcAft>
+              <a:buClr>
+                <a:schemeClr val="dk1"/>
+              </a:buClr>
+              <a:buSzPts val="1100"/>
+              <a:buFont typeface="Arial"/>
+              <a:buNone/>
+            </a:pPr>
+            <a:r>
+              <a:rPr lang="en"/>
+              <a:t>@data última versão: [13/06/2025]</a:t>
+            </a:r>
+            <a:endParaRPr/>
+          </a:p>
+          <a:p>
+            <a:pPr indent="0" lvl="0" marL="0" rtl="0" algn="l">
+              <a:spcBef>
+                <a:spcPts val="1200"/>
+              </a:spcBef>
+              <a:spcAft>
+                <a:spcPts val="0"/>
+              </a:spcAft>
+              <a:buClr>
+                <a:schemeClr val="dk1"/>
+              </a:buClr>
+              <a:buSzPts val="1100"/>
+              <a:buFont typeface="Arial"/>
+              <a:buNone/>
+            </a:pPr>
+            <a:r>
+              <a:rPr lang="en"/>
+              <a:t>@versão: 1.0</a:t>
+            </a:r>
+            <a:endParaRPr/>
+          </a:p>
+          <a:p>
+            <a:pPr indent="0" lvl="0" marL="0" rtl="0" algn="l">
+              <a:spcBef>
+                <a:spcPts val="1200"/>
+              </a:spcBef>
+              <a:spcAft>
+                <a:spcPts val="0"/>
+              </a:spcAft>
+              <a:buClr>
+                <a:schemeClr val="dk1"/>
+              </a:buClr>
+              <a:buSzPts val="1100"/>
+              <a:buFont typeface="Arial"/>
+              <a:buNone/>
+            </a:pPr>
+            <a:r>
+              <a:rPr lang="en"/>
+              <a:t>@outros repositórios: [https://github.com/filipe-pinheiro - https://github.com/guilherme-rms-cv]</a:t>
+            </a:r>
+            <a:endParaRPr/>
+          </a:p>
+          <a:p>
+            <a:pPr indent="0" lvl="0" marL="0" rtl="0" algn="l">
+              <a:spcBef>
+                <a:spcPts val="1200"/>
+              </a:spcBef>
+              <a:spcAft>
+                <a:spcPts val="1200"/>
+              </a:spcAft>
+              <a:buNone/>
+            </a:pPr>
+            <a:r>
+              <a:rPr lang="en"/>
+              <a:t>@Agradecimentos: Universidade Federal do Maranhão (UFMA), Professor Doutor Thales Levi Azevedo Valente, e colegas de curso.</a:t>
+            </a:r>
+            <a:endParaRPr/>
+          </a:p>
+        </p:txBody>
+      </p:sp>
+      <p:sp>
+        <p:nvSpPr>
+          <p:cNvPr id="743" name="Google Shape;743;p92"/>
+          <p:cNvSpPr txBox="1"/>
+          <p:nvPr>
+            <p:ph idx="12" type="sldNum"/>
+          </p:nvPr>
+        </p:nvSpPr>
+        <p:spPr>
+          <a:xfrm>
+            <a:off x="8472458" y="4663217"/>
+            <a:ext cx="548700" cy="393600"/>
+          </a:xfrm>
+          <a:prstGeom prst="rect">
+            <a:avLst/>
+          </a:prstGeom>
+        </p:spPr>
+        <p:txBody>
+          <a:bodyPr anchorCtr="0" anchor="ctr" bIns="91425" lIns="91425" spcFirstLastPara="1" rIns="91425" wrap="square" tIns="91425">
+            <a:normAutofit/>
+          </a:bodyPr>
+          <a:lstStyle/>
+          <a:p>
+            <a:pPr indent="0" lvl="0" marL="0" rtl="0" algn="r">
+              <a:spcBef>
+                <a:spcPts val="0"/>
+              </a:spcBef>
+              <a:spcAft>
+                <a:spcPts val="0"/>
+              </a:spcAft>
+              <a:buNone/>
+            </a:pPr>
+            <a:fld id="{00000000-1234-1234-1234-123412341234}" type="slidenum">
+              <a:rPr lang="en"/>
+              <a:t>‹#›</a:t>
+            </a:fld>
+            <a:endParaRPr/>
+          </a:p>
+        </p:txBody>
+      </p:sp>
+    </p:spTree>
+  </p:cSld>
+  <p:clrMapOvr>
+    <a:masterClrMapping/>
+  </p:clrMapOvr>
+</p:sld>
+</file>
+
+<file path=ppt/slides/slide81.xml><?xml version="1.0" encoding="utf-8"?>
+<p:sld xmlns:a="http://schemas.openxmlformats.org/drawingml/2006/main" xmlns:r="http://schemas.openxmlformats.org/officeDocument/2006/relationships" xmlns:mc="http://schemas.openxmlformats.org/markup-compatibility/2006" xmlns:mv="urn:schemas-microsoft-com:mac:vml" xmlns:p="http://schemas.openxmlformats.org/presentationml/2006/main" xmlns:c="http://schemas.openxmlformats.org/drawingml/2006/chart" xmlns:dgm="http://schemas.openxmlformats.org/drawingml/2006/diagram" xmlns:o="urn:schemas-microsoft-com:office:office" xmlns:v="urn:schemas-microsoft-com:vml" xmlns:pvml="urn:schemas-microsoft-com:office:powerpoint" xmlns:com="http://schemas.openxmlformats.org/drawingml/2006/compatibility" xmlns:p14="http://schemas.microsoft.com/office/powerpoint/2010/main" xmlns:p15="http://schemas.microsoft.com/office/powerpoint/2012/main" xmlns:ahyp="http://schemas.microsoft.com/office/drawing/2018/hyperlinkcolor">
+  <p:cSld>
+    <p:spTree>
+      <p:nvGrpSpPr>
+        <p:cNvPr id="747" name="Shape 747"/>
+        <p:cNvGrpSpPr/>
+        <p:nvPr/>
+      </p:nvGrpSpPr>
+      <p:grpSpPr>
+        <a:xfrm>
+          <a:off x="0" y="0"/>
+          <a:ext cx="0" cy="0"/>
+          <a:chOff x="0" y="0"/>
+          <a:chExt cx="0" cy="0"/>
+        </a:xfrm>
+      </p:grpSpPr>
+      <p:sp>
+        <p:nvSpPr>
+          <p:cNvPr id="748" name="Google Shape;748;p93"/>
+          <p:cNvSpPr txBox="1"/>
+          <p:nvPr>
+            <p:ph type="title"/>
+          </p:nvPr>
+        </p:nvSpPr>
+        <p:spPr>
+          <a:xfrm>
+            <a:off x="311700" y="445025"/>
+            <a:ext cx="8520600" cy="572700"/>
+          </a:xfrm>
+          <a:prstGeom prst="rect">
+            <a:avLst/>
+          </a:prstGeom>
+        </p:spPr>
+        <p:txBody>
+          <a:bodyPr anchorCtr="0" anchor="t" bIns="91425" lIns="91425" spcFirstLastPara="1" rIns="91425" wrap="square" tIns="91425">
+            <a:normAutofit fontScale="90000"/>
+          </a:bodyPr>
+          <a:lstStyle/>
+          <a:p>
+            <a:pPr indent="0" lvl="0" marL="0" rtl="0" algn="l">
+              <a:spcBef>
+                <a:spcPts val="0"/>
+              </a:spcBef>
+              <a:spcAft>
+                <a:spcPts val="0"/>
+              </a:spcAft>
+              <a:buNone/>
+            </a:pPr>
+            <a:r>
+              <a:rPr lang="en"/>
+              <a:t>Copyright / License</a:t>
+            </a:r>
+            <a:endParaRPr/>
+          </a:p>
+        </p:txBody>
+      </p:sp>
+      <p:sp>
+        <p:nvSpPr>
+          <p:cNvPr id="749" name="Google Shape;749;p93"/>
+          <p:cNvSpPr txBox="1"/>
+          <p:nvPr>
+            <p:ph idx="1" type="body"/>
+          </p:nvPr>
+        </p:nvSpPr>
+        <p:spPr>
+          <a:xfrm>
+            <a:off x="311700" y="1152475"/>
+            <a:ext cx="8520600" cy="3416400"/>
+          </a:xfrm>
+          <a:prstGeom prst="rect">
+            <a:avLst/>
+          </a:prstGeom>
+        </p:spPr>
+        <p:txBody>
+          <a:bodyPr anchorCtr="0" anchor="t" bIns="91425" lIns="91425" spcFirstLastPara="1" rIns="91425" wrap="square" tIns="91425">
+            <a:normAutofit fontScale="77500" lnSpcReduction="20000"/>
+          </a:bodyPr>
+          <a:lstStyle/>
+          <a:p>
+            <a:pPr indent="0" lvl="0" marL="0" rtl="0" algn="l">
+              <a:spcBef>
+                <a:spcPts val="0"/>
+              </a:spcBef>
+              <a:spcAft>
+                <a:spcPts val="0"/>
+              </a:spcAft>
+              <a:buClr>
+                <a:schemeClr val="dk1"/>
+              </a:buClr>
+              <a:buSzPct val="61111"/>
+              <a:buFont typeface="Arial"/>
+              <a:buNone/>
+            </a:pPr>
+            <a:r>
+              <a:rPr lang="en"/>
+              <a:t>Este material é resultado de um trabalho acadêmico para a disciplina EECP0053 - TÓPICOS EM ENGENHARIA DA COMPUTAÇÃO II - FUNDAMENTOS DE REDES NEURAIS, sob a orientação do professor Dr. Thales Levi Azevedo Valente, semestre letivo 2025.1, curso Engenharia da Computação, na Universidade Federal do Maranhão (UFMA).</a:t>
+            </a:r>
+            <a:endParaRPr/>
+          </a:p>
+          <a:p>
+            <a:pPr indent="0" lvl="0" marL="0" rtl="0" algn="l">
+              <a:spcBef>
+                <a:spcPts val="1200"/>
+              </a:spcBef>
+              <a:spcAft>
+                <a:spcPts val="0"/>
+              </a:spcAft>
+              <a:buClr>
+                <a:schemeClr val="dk1"/>
+              </a:buClr>
+              <a:buSzPct val="61111"/>
+              <a:buFont typeface="Arial"/>
+              <a:buNone/>
+            </a:pPr>
+            <a:r>
+              <a:rPr lang="en"/>
+              <a:t>Todo o material sob esta licença é software livre: pode ser usado para fins acadêmicos e comerciais sem nenhum custo.</a:t>
+            </a:r>
+            <a:endParaRPr/>
+          </a:p>
+          <a:p>
+            <a:pPr indent="0" lvl="0" marL="0" rtl="0" algn="l">
+              <a:spcBef>
+                <a:spcPts val="1200"/>
+              </a:spcBef>
+              <a:spcAft>
+                <a:spcPts val="0"/>
+              </a:spcAft>
+              <a:buClr>
+                <a:schemeClr val="dk1"/>
+              </a:buClr>
+              <a:buSzPct val="61111"/>
+              <a:buFont typeface="Arial"/>
+              <a:buNone/>
+            </a:pPr>
+            <a:r>
+              <a:rPr lang="en"/>
+              <a:t>Não há papelada, nem royalties, nem restrições de "copyleft" do tipo GNU.</a:t>
+            </a:r>
+            <a:endParaRPr/>
+          </a:p>
+          <a:p>
+            <a:pPr indent="0" lvl="0" marL="0" rtl="0" algn="l">
+              <a:spcBef>
+                <a:spcPts val="1200"/>
+              </a:spcBef>
+              <a:spcAft>
+                <a:spcPts val="0"/>
+              </a:spcAft>
+              <a:buClr>
+                <a:schemeClr val="dk1"/>
+              </a:buClr>
+              <a:buSzPct val="61111"/>
+              <a:buFont typeface="Arial"/>
+              <a:buNone/>
+            </a:pPr>
+            <a:r>
+              <a:rPr lang="en"/>
+              <a:t>Ele é licenciado sob os termos da Licença MIT, conforme descrito abaixo, e, portanto, é compatível com a GPL e também se qualifica como software de código aberto.</a:t>
+            </a:r>
+            <a:endParaRPr/>
+          </a:p>
+          <a:p>
+            <a:pPr indent="0" lvl="0" marL="0" rtl="0" algn="l">
+              <a:spcBef>
+                <a:spcPts val="1200"/>
+              </a:spcBef>
+              <a:spcAft>
+                <a:spcPts val="0"/>
+              </a:spcAft>
+              <a:buClr>
+                <a:schemeClr val="dk1"/>
+              </a:buClr>
+              <a:buSzPct val="61111"/>
+              <a:buFont typeface="Arial"/>
+              <a:buNone/>
+            </a:pPr>
+            <a:r>
+              <a:rPr lang="en"/>
+              <a:t>É de domínio público. O espírito desta licença é que você é livre para usar este material para qualquer finalidade, sem nenhum custo.</a:t>
+            </a:r>
+            <a:endParaRPr/>
+          </a:p>
+          <a:p>
+            <a:pPr indent="0" lvl="0" marL="0" rtl="0" algn="l">
+              <a:spcBef>
+                <a:spcPts val="1200"/>
+              </a:spcBef>
+              <a:spcAft>
+                <a:spcPts val="1200"/>
+              </a:spcAft>
+              <a:buNone/>
+            </a:pPr>
+            <a:r>
+              <a:rPr lang="en"/>
+              <a:t>O único requisito é que, se você usá-lo, nos dê crédito.</a:t>
+            </a:r>
+            <a:endParaRPr/>
+          </a:p>
+        </p:txBody>
+      </p:sp>
+      <p:sp>
+        <p:nvSpPr>
+          <p:cNvPr id="750" name="Google Shape;750;p93"/>
+          <p:cNvSpPr txBox="1"/>
+          <p:nvPr>
+            <p:ph idx="12" type="sldNum"/>
+          </p:nvPr>
+        </p:nvSpPr>
+        <p:spPr>
+          <a:xfrm>
+            <a:off x="8472458" y="4663217"/>
+            <a:ext cx="548700" cy="393600"/>
+          </a:xfrm>
+          <a:prstGeom prst="rect">
+            <a:avLst/>
+          </a:prstGeom>
+        </p:spPr>
+        <p:txBody>
+          <a:bodyPr anchorCtr="0" anchor="ctr" bIns="91425" lIns="91425" spcFirstLastPara="1" rIns="91425" wrap="square" tIns="91425">
+            <a:normAutofit/>
+          </a:bodyPr>
+          <a:lstStyle/>
+          <a:p>
+            <a:pPr indent="0" lvl="0" marL="0" rtl="0" algn="r">
+              <a:spcBef>
+                <a:spcPts val="0"/>
+              </a:spcBef>
+              <a:spcAft>
+                <a:spcPts val="0"/>
+              </a:spcAft>
+              <a:buNone/>
+            </a:pPr>
+            <a:fld id="{00000000-1234-1234-1234-123412341234}" type="slidenum">
+              <a:rPr lang="en"/>
+              <a:t>‹#›</a:t>
+            </a:fld>
+            <a:endParaRPr/>
+          </a:p>
+        </p:txBody>
+      </p:sp>
+    </p:spTree>
+  </p:cSld>
+  <p:clrMapOvr>
+    <a:masterClrMapping/>
+  </p:clrMapOvr>
+</p:sld>
+</file>
+
+<file path=ppt/slides/slide82.xml><?xml version="1.0" encoding="utf-8"?>
+<p:sld xmlns:a="http://schemas.openxmlformats.org/drawingml/2006/main" xmlns:r="http://schemas.openxmlformats.org/officeDocument/2006/relationships" xmlns:mc="http://schemas.openxmlformats.org/markup-compatibility/2006" xmlns:mv="urn:schemas-microsoft-com:mac:vml" xmlns:p="http://schemas.openxmlformats.org/presentationml/2006/main" xmlns:c="http://schemas.openxmlformats.org/drawingml/2006/chart" xmlns:dgm="http://schemas.openxmlformats.org/drawingml/2006/diagram" xmlns:o="urn:schemas-microsoft-com:office:office" xmlns:v="urn:schemas-microsoft-com:vml" xmlns:pvml="urn:schemas-microsoft-com:office:powerpoint" xmlns:com="http://schemas.openxmlformats.org/drawingml/2006/compatibility" xmlns:p14="http://schemas.microsoft.com/office/powerpoint/2010/main" xmlns:p15="http://schemas.microsoft.com/office/powerpoint/2012/main" xmlns:ahyp="http://schemas.microsoft.com/office/drawing/2018/hyperlinkcolor">
+  <p:cSld>
+    <p:spTree>
+      <p:nvGrpSpPr>
+        <p:cNvPr id="754" name="Shape 754"/>
+        <p:cNvGrpSpPr/>
+        <p:nvPr/>
+      </p:nvGrpSpPr>
+      <p:grpSpPr>
+        <a:xfrm>
+          <a:off x="0" y="0"/>
+          <a:ext cx="0" cy="0"/>
+          <a:chOff x="0" y="0"/>
+          <a:chExt cx="0" cy="0"/>
+        </a:xfrm>
+      </p:grpSpPr>
+      <p:sp>
+        <p:nvSpPr>
+          <p:cNvPr id="755" name="Google Shape;755;p94"/>
+          <p:cNvSpPr txBox="1"/>
+          <p:nvPr>
+            <p:ph type="title"/>
+          </p:nvPr>
+        </p:nvSpPr>
+        <p:spPr>
+          <a:xfrm>
+            <a:off x="311700" y="445025"/>
+            <a:ext cx="8520600" cy="572700"/>
+          </a:xfrm>
+          <a:prstGeom prst="rect">
+            <a:avLst/>
+          </a:prstGeom>
+        </p:spPr>
+        <p:txBody>
+          <a:bodyPr anchorCtr="0" anchor="t" bIns="91425" lIns="91425" spcFirstLastPara="1" rIns="91425" wrap="square" tIns="91425">
+            <a:normAutofit fontScale="90000"/>
+          </a:bodyPr>
+          <a:lstStyle/>
+          <a:p>
+            <a:pPr indent="0" lvl="0" marL="0" rtl="0" algn="l">
+              <a:spcBef>
+                <a:spcPts val="0"/>
+              </a:spcBef>
+              <a:spcAft>
+                <a:spcPts val="0"/>
+              </a:spcAft>
+              <a:buNone/>
+            </a:pPr>
+            <a:r>
+              <a:rPr lang="en"/>
+              <a:t>Licenciado sob a Licença MIT.</a:t>
+            </a:r>
+            <a:endParaRPr/>
+          </a:p>
+        </p:txBody>
+      </p:sp>
+      <p:sp>
+        <p:nvSpPr>
+          <p:cNvPr id="756" name="Google Shape;756;p94"/>
+          <p:cNvSpPr txBox="1"/>
+          <p:nvPr>
+            <p:ph idx="1" type="body"/>
+          </p:nvPr>
+        </p:nvSpPr>
+        <p:spPr>
+          <a:xfrm>
+            <a:off x="311700" y="1017725"/>
+            <a:ext cx="8520600" cy="4039200"/>
+          </a:xfrm>
+          <a:prstGeom prst="rect">
+            <a:avLst/>
+          </a:prstGeom>
+        </p:spPr>
+        <p:txBody>
+          <a:bodyPr anchorCtr="0" anchor="t" bIns="91425" lIns="91425" spcFirstLastPara="1" rIns="91425" wrap="square" tIns="91425">
+            <a:normAutofit fontScale="62500" lnSpcReduction="10000"/>
+          </a:bodyPr>
+          <a:lstStyle/>
+          <a:p>
+            <a:pPr indent="0" lvl="0" marL="0" rtl="0" algn="l">
+              <a:spcBef>
+                <a:spcPts val="0"/>
+              </a:spcBef>
+              <a:spcAft>
+                <a:spcPts val="0"/>
+              </a:spcAft>
+              <a:buClr>
+                <a:schemeClr val="dk1"/>
+              </a:buClr>
+              <a:buSzPct val="61111"/>
+              <a:buFont typeface="Arial"/>
+              <a:buNone/>
+            </a:pPr>
+            <a:r>
+              <a:rPr lang="en"/>
+              <a:t>Permissão é concedida, gratuitamente, a qualquer pessoa que obtenha uma cópia deste software e dos arquivos de documentação associados (o "Software"), para lidar no Software sem restrição, incluindo sem limitação os direitos de usar, copiar, modificar, mesclar, publicar, distribuir, sublicenciar e/ou vender cópias do Software, e permitir pessoas a quem o Software é fornecido a fazê-lo, sujeito às seguintes condições:</a:t>
+            </a:r>
+            <a:endParaRPr/>
+          </a:p>
+          <a:p>
+            <a:pPr indent="0" lvl="0" marL="0" rtl="0" algn="l">
+              <a:spcBef>
+                <a:spcPts val="1200"/>
+              </a:spcBef>
+              <a:spcAft>
+                <a:spcPts val="0"/>
+              </a:spcAft>
+              <a:buClr>
+                <a:schemeClr val="dk1"/>
+              </a:buClr>
+              <a:buSzPct val="61111"/>
+              <a:buFont typeface="Arial"/>
+              <a:buNone/>
+            </a:pPr>
+            <a:r>
+              <a:rPr lang="en"/>
+              <a:t>Este aviso de direitos autorais e este aviso de permissão devem ser incluídos em todas as cópias ou partes substanciais do Software.</a:t>
+            </a:r>
+            <a:endParaRPr/>
+          </a:p>
+          <a:p>
+            <a:pPr indent="0" lvl="0" marL="0" rtl="0" algn="l">
+              <a:spcBef>
+                <a:spcPts val="1200"/>
+              </a:spcBef>
+              <a:spcAft>
+                <a:spcPts val="0"/>
+              </a:spcAft>
+              <a:buClr>
+                <a:schemeClr val="dk1"/>
+              </a:buClr>
+              <a:buSzPct val="61111"/>
+              <a:buFont typeface="Arial"/>
+              <a:buNone/>
+            </a:pPr>
+            <a:r>
+              <a:rPr lang="en"/>
+              <a:t>O SOFTWARE É FORNECIDO "COMO ESTÁ", SEM GARANTIA DE QUALQUER TIPO,</a:t>
+            </a:r>
+            <a:endParaRPr/>
+          </a:p>
+          <a:p>
+            <a:pPr indent="0" lvl="0" marL="0" rtl="0" algn="l">
+              <a:spcBef>
+                <a:spcPts val="1200"/>
+              </a:spcBef>
+              <a:spcAft>
+                <a:spcPts val="0"/>
+              </a:spcAft>
+              <a:buClr>
+                <a:schemeClr val="dk1"/>
+              </a:buClr>
+              <a:buSzPct val="61111"/>
+              <a:buFont typeface="Arial"/>
+              <a:buNone/>
+            </a:pPr>
+            <a:r>
+              <a:rPr lang="en"/>
+              <a:t>EXPRESSA OU IMPLÍCITA, INCLUINDO MAS NÃO SE LIMITANDO ÀS GARANTIAS DE COMERCIALIZAÇÃO,</a:t>
+            </a:r>
+            <a:endParaRPr/>
+          </a:p>
+          <a:p>
+            <a:pPr indent="0" lvl="0" marL="0" rtl="0" algn="l">
+              <a:spcBef>
+                <a:spcPts val="1200"/>
+              </a:spcBef>
+              <a:spcAft>
+                <a:spcPts val="0"/>
+              </a:spcAft>
+              <a:buClr>
+                <a:schemeClr val="dk1"/>
+              </a:buClr>
+              <a:buSzPct val="61111"/>
+              <a:buFont typeface="Arial"/>
+              <a:buNone/>
+            </a:pPr>
+            <a:r>
+              <a:rPr lang="en"/>
+              <a:t>ADEQUAÇÃO A UM DETERMINADO FIM E NÃO INFRINGÊNCIA.</a:t>
+            </a:r>
+            <a:endParaRPr/>
+          </a:p>
+          <a:p>
+            <a:pPr indent="0" lvl="0" marL="0" rtl="0" algn="l">
+              <a:spcBef>
+                <a:spcPts val="1200"/>
+              </a:spcBef>
+              <a:spcAft>
+                <a:spcPts val="0"/>
+              </a:spcAft>
+              <a:buClr>
+                <a:schemeClr val="dk1"/>
+              </a:buClr>
+              <a:buSzPct val="61111"/>
+              <a:buFont typeface="Arial"/>
+              <a:buNone/>
+            </a:pPr>
+            <a:r>
+              <a:rPr lang="en"/>
+              <a:t>EM NENHUM CASO OS AUTORES OU DETENTORES DE DIREITOS AUTORAIS SERÃO RESPONSÁVEIS</a:t>
+            </a:r>
+            <a:endParaRPr/>
+          </a:p>
+          <a:p>
+            <a:pPr indent="0" lvl="0" marL="0" rtl="0" algn="l">
+              <a:spcBef>
+                <a:spcPts val="1200"/>
+              </a:spcBef>
+              <a:spcAft>
+                <a:spcPts val="0"/>
+              </a:spcAft>
+              <a:buClr>
+                <a:schemeClr val="dk1"/>
+              </a:buClr>
+              <a:buSzPct val="61111"/>
+              <a:buFont typeface="Arial"/>
+              <a:buNone/>
+            </a:pPr>
+            <a:r>
+              <a:rPr lang="en"/>
+              <a:t>POR QUALQUER RECLAMAÇÃO, DANOS OU OUTRA RESPONSABILIDADE,</a:t>
+            </a:r>
+            <a:endParaRPr/>
+          </a:p>
+          <a:p>
+            <a:pPr indent="0" lvl="0" marL="0" rtl="0" algn="l">
+              <a:spcBef>
+                <a:spcPts val="1200"/>
+              </a:spcBef>
+              <a:spcAft>
+                <a:spcPts val="0"/>
+              </a:spcAft>
+              <a:buClr>
+                <a:schemeClr val="dk1"/>
+              </a:buClr>
+              <a:buSzPct val="61111"/>
+              <a:buFont typeface="Arial"/>
+              <a:buNone/>
+            </a:pPr>
+            <a:r>
+              <a:rPr lang="en"/>
+              <a:t>SEJA EM AÇÃO DE CONTRATO, TORT OU OUTRA FORMA,</a:t>
+            </a:r>
+            <a:endParaRPr/>
+          </a:p>
+          <a:p>
+            <a:pPr indent="0" lvl="0" marL="0" rtl="0" algn="l">
+              <a:spcBef>
+                <a:spcPts val="1200"/>
+              </a:spcBef>
+              <a:spcAft>
+                <a:spcPts val="0"/>
+              </a:spcAft>
+              <a:buClr>
+                <a:schemeClr val="dk1"/>
+              </a:buClr>
+              <a:buSzPct val="61111"/>
+              <a:buFont typeface="Arial"/>
+              <a:buNone/>
+            </a:pPr>
+            <a:r>
+              <a:rPr lang="en"/>
+              <a:t>DECORRENTE DE, FORA DE OU EM CONEXÃO COM O SOFTWARE OU O USO OU OUTRAS NEGOCIAÇÕES NO SOFTWARE.</a:t>
+            </a:r>
+            <a:endParaRPr/>
+          </a:p>
+          <a:p>
+            <a:pPr indent="0" lvl="0" marL="0" rtl="0" algn="l">
+              <a:spcBef>
+                <a:spcPts val="1200"/>
+              </a:spcBef>
+              <a:spcAft>
+                <a:spcPts val="0"/>
+              </a:spcAft>
+              <a:buClr>
+                <a:schemeClr val="dk1"/>
+              </a:buClr>
+              <a:buSzPct val="61111"/>
+              <a:buFont typeface="Arial"/>
+              <a:buNone/>
+            </a:pPr>
+            <a:r>
+              <a:rPr lang="en"/>
+              <a:t>Para mais informações sobre a Licença MIT:</a:t>
+            </a:r>
+            <a:endParaRPr/>
+          </a:p>
+          <a:p>
+            <a:pPr indent="0" lvl="0" marL="0" rtl="0" algn="l">
+              <a:spcBef>
+                <a:spcPts val="1200"/>
+              </a:spcBef>
+              <a:spcAft>
+                <a:spcPts val="1200"/>
+              </a:spcAft>
+              <a:buNone/>
+            </a:pPr>
+            <a:r>
+              <a:rPr lang="en"/>
+              <a:t>https://opensource.org/licenses/MIT</a:t>
+            </a:r>
+            <a:endParaRPr/>
+          </a:p>
+        </p:txBody>
+      </p:sp>
+      <p:sp>
+        <p:nvSpPr>
+          <p:cNvPr id="757" name="Google Shape;757;p94"/>
+          <p:cNvSpPr txBox="1"/>
+          <p:nvPr>
+            <p:ph idx="12" type="sldNum"/>
+          </p:nvPr>
+        </p:nvSpPr>
+        <p:spPr>
+          <a:xfrm>
+            <a:off x="8472458" y="4663217"/>
+            <a:ext cx="548700" cy="393600"/>
+          </a:xfrm>
+          <a:prstGeom prst="rect">
+            <a:avLst/>
+          </a:prstGeom>
+        </p:spPr>
+        <p:txBody>
+          <a:bodyPr anchorCtr="0" anchor="ctr" bIns="91425" lIns="91425" spcFirstLastPara="1" rIns="91425" wrap="square" tIns="91425">
+            <a:normAutofit/>
+          </a:bodyPr>
+          <a:lstStyle/>
+          <a:p>
+            <a:pPr indent="0" lvl="0" marL="0" rtl="0" algn="r">
+              <a:spcBef>
+                <a:spcPts val="0"/>
+              </a:spcBef>
+              <a:spcAft>
+                <a:spcPts val="0"/>
+              </a:spcAft>
+              <a:buNone/>
+            </a:pPr>
+            <a:fld id="{00000000-1234-1234-1234-123412341234}" type="slidenum">
+              <a:rPr lang="en"/>
+              <a:t>‹#›</a:t>
+            </a:fld>
+            <a:endParaRPr/>
+          </a:p>
+        </p:txBody>
+      </p:sp>
+    </p:spTree>
+  </p:cSld>
+  <p:clrMapOvr>
+    <a:masterClrMapping/>
+  </p:clrMapOvr>
+</p:sld>
+</file>
+
 <file path=ppt/slides/slide9.xml><?xml version="1.0" encoding="utf-8"?>
 <p:sld xmlns:a="http://schemas.openxmlformats.org/drawingml/2006/main" xmlns:r="http://schemas.openxmlformats.org/officeDocument/2006/relationships" xmlns:mc="http://schemas.openxmlformats.org/markup-compatibility/2006" xmlns:mv="urn:schemas-microsoft-com:mac:vml" xmlns:p="http://schemas.openxmlformats.org/presentationml/2006/main" xmlns:c="http://schemas.openxmlformats.org/drawingml/2006/chart" xmlns:dgm="http://schemas.openxmlformats.org/drawingml/2006/diagram" xmlns:o="urn:schemas-microsoft-com:office:office" xmlns:v="urn:schemas-microsoft-com:vml" xmlns:pvml="urn:schemas-microsoft-com:office:powerpoint" xmlns:com="http://schemas.openxmlformats.org/drawingml/2006/compatibility" xmlns:p14="http://schemas.microsoft.com/office/powerpoint/2010/main" xmlns:p15="http://schemas.microsoft.com/office/powerpoint/2012/main" xmlns:ahyp="http://schemas.microsoft.com/office/drawing/2018/hyperlinkcolor">
   <p:cSld>

</xml_diff>